<commit_message>
Add new ppts or Update scale
</commit_message>
<xml_diff>
--- a/何等恩典(崇拜版).pptx
+++ b/何等恩典(崇拜版).pptx
@@ -9,7 +9,7 @@
     <p:sldId id="257" r:id="rId3"/>
     <p:sldId id="258" r:id="rId4"/>
   </p:sldIdLst>
-  <p:sldSz cx="9144000" cy="6858000" type="screen4x3"/>
+  <p:sldSz cx="9144000" cy="5143500" type="screen16x9"/>
   <p:notesSz cx="6858000" cy="9144000"/>
   <p:defaultTextStyle>
     <a:defPPr>
@@ -138,8 +138,8 @@
         </p:nvSpPr>
         <p:spPr>
           <a:xfrm>
-            <a:off x="685800" y="2130425"/>
-            <a:ext cx="7772400" cy="1470025"/>
+            <a:off x="685800" y="1597819"/>
+            <a:ext cx="7772400" cy="1102519"/>
           </a:xfrm>
         </p:spPr>
         <p:txBody>
@@ -166,8 +166,8 @@
         </p:nvSpPr>
         <p:spPr>
           <a:xfrm>
-            <a:off x="1371600" y="3886200"/>
-            <a:ext cx="6400800" cy="1752600"/>
+            <a:off x="1371600" y="2914650"/>
+            <a:ext cx="6400800" cy="1314450"/>
           </a:xfrm>
         </p:spPr>
         <p:txBody>
@@ -290,7 +290,7 @@
           <a:p>
             <a:fld id="{304EAD91-56F9-4EB2-AFAA-94188B17C6C2}" type="datetimeFigureOut">
               <a:rPr lang="zh-TW" altLang="en-US" smtClean="0"/>
-              <a:t>2018/3/18</a:t>
+              <a:t>2019/7/20</a:t>
             </a:fld>
             <a:endParaRPr lang="zh-TW" altLang="en-US"/>
           </a:p>
@@ -455,7 +455,7 @@
           <a:p>
             <a:fld id="{304EAD91-56F9-4EB2-AFAA-94188B17C6C2}" type="datetimeFigureOut">
               <a:rPr lang="zh-TW" altLang="en-US" smtClean="0"/>
-              <a:t>2018/3/18</a:t>
+              <a:t>2019/7/20</a:t>
             </a:fld>
             <a:endParaRPr lang="zh-TW" altLang="en-US"/>
           </a:p>
@@ -540,8 +540,8 @@
         </p:nvSpPr>
         <p:spPr>
           <a:xfrm>
-            <a:off x="6629400" y="274638"/>
-            <a:ext cx="2057400" cy="5851525"/>
+            <a:off x="6629400" y="205979"/>
+            <a:ext cx="2057400" cy="4388644"/>
           </a:xfrm>
         </p:spPr>
         <p:txBody>
@@ -568,8 +568,8 @@
         </p:nvSpPr>
         <p:spPr>
           <a:xfrm>
-            <a:off x="457200" y="274638"/>
-            <a:ext cx="6019800" cy="5851525"/>
+            <a:off x="457200" y="205979"/>
+            <a:ext cx="6019800" cy="4388644"/>
           </a:xfrm>
         </p:spPr>
         <p:txBody>
@@ -630,7 +630,7 @@
           <a:p>
             <a:fld id="{304EAD91-56F9-4EB2-AFAA-94188B17C6C2}" type="datetimeFigureOut">
               <a:rPr lang="zh-TW" altLang="en-US" smtClean="0"/>
-              <a:t>2018/3/18</a:t>
+              <a:t>2019/7/20</a:t>
             </a:fld>
             <a:endParaRPr lang="zh-TW" altLang="en-US"/>
           </a:p>
@@ -795,7 +795,7 @@
           <a:p>
             <a:fld id="{304EAD91-56F9-4EB2-AFAA-94188B17C6C2}" type="datetimeFigureOut">
               <a:rPr lang="zh-TW" altLang="en-US" smtClean="0"/>
-              <a:t>2018/3/18</a:t>
+              <a:t>2019/7/20</a:t>
             </a:fld>
             <a:endParaRPr lang="zh-TW" altLang="en-US"/>
           </a:p>
@@ -880,8 +880,8 @@
         </p:nvSpPr>
         <p:spPr>
           <a:xfrm>
-            <a:off x="722313" y="4406900"/>
-            <a:ext cx="7772400" cy="1362075"/>
+            <a:off x="722313" y="3305176"/>
+            <a:ext cx="7772400" cy="1021556"/>
           </a:xfrm>
         </p:spPr>
         <p:txBody>
@@ -912,8 +912,8 @@
         </p:nvSpPr>
         <p:spPr>
           <a:xfrm>
-            <a:off x="722313" y="2906713"/>
-            <a:ext cx="7772400" cy="1500187"/>
+            <a:off x="722313" y="2180035"/>
+            <a:ext cx="7772400" cy="1125140"/>
           </a:xfrm>
         </p:spPr>
         <p:txBody>
@@ -1036,7 +1036,7 @@
           <a:p>
             <a:fld id="{304EAD91-56F9-4EB2-AFAA-94188B17C6C2}" type="datetimeFigureOut">
               <a:rPr lang="zh-TW" altLang="en-US" smtClean="0"/>
-              <a:t>2018/3/18</a:t>
+              <a:t>2019/7/20</a:t>
             </a:fld>
             <a:endParaRPr lang="zh-TW" altLang="en-US"/>
           </a:p>
@@ -1144,8 +1144,8 @@
         </p:nvSpPr>
         <p:spPr>
           <a:xfrm>
-            <a:off x="457200" y="1600200"/>
-            <a:ext cx="4038600" cy="4525963"/>
+            <a:off x="457200" y="1200151"/>
+            <a:ext cx="4038600" cy="3394472"/>
           </a:xfrm>
         </p:spPr>
         <p:txBody>
@@ -1229,8 +1229,8 @@
         </p:nvSpPr>
         <p:spPr>
           <a:xfrm>
-            <a:off x="4648200" y="1600200"/>
-            <a:ext cx="4038600" cy="4525963"/>
+            <a:off x="4648200" y="1200151"/>
+            <a:ext cx="4038600" cy="3394472"/>
           </a:xfrm>
         </p:spPr>
         <p:txBody>
@@ -1319,7 +1319,7 @@
           <a:p>
             <a:fld id="{304EAD91-56F9-4EB2-AFAA-94188B17C6C2}" type="datetimeFigureOut">
               <a:rPr lang="zh-TW" altLang="en-US" smtClean="0"/>
-              <a:t>2018/3/18</a:t>
+              <a:t>2019/7/20</a:t>
             </a:fld>
             <a:endParaRPr lang="zh-TW" altLang="en-US"/>
           </a:p>
@@ -1431,8 +1431,8 @@
         </p:nvSpPr>
         <p:spPr>
           <a:xfrm>
-            <a:off x="457200" y="1535113"/>
-            <a:ext cx="4040188" cy="639762"/>
+            <a:off x="457200" y="1151335"/>
+            <a:ext cx="4040188" cy="479822"/>
           </a:xfrm>
         </p:spPr>
         <p:txBody>
@@ -1496,8 +1496,8 @@
         </p:nvSpPr>
         <p:spPr>
           <a:xfrm>
-            <a:off x="457200" y="2174875"/>
-            <a:ext cx="4040188" cy="3951288"/>
+            <a:off x="457200" y="1631156"/>
+            <a:ext cx="4040188" cy="2963466"/>
           </a:xfrm>
         </p:spPr>
         <p:txBody>
@@ -1581,8 +1581,8 @@
         </p:nvSpPr>
         <p:spPr>
           <a:xfrm>
-            <a:off x="4645025" y="1535113"/>
-            <a:ext cx="4041775" cy="639762"/>
+            <a:off x="4645026" y="1151335"/>
+            <a:ext cx="4041775" cy="479822"/>
           </a:xfrm>
         </p:spPr>
         <p:txBody>
@@ -1646,8 +1646,8 @@
         </p:nvSpPr>
         <p:spPr>
           <a:xfrm>
-            <a:off x="4645025" y="2174875"/>
-            <a:ext cx="4041775" cy="3951288"/>
+            <a:off x="4645026" y="1631156"/>
+            <a:ext cx="4041775" cy="2963466"/>
           </a:xfrm>
         </p:spPr>
         <p:txBody>
@@ -1736,7 +1736,7 @@
           <a:p>
             <a:fld id="{304EAD91-56F9-4EB2-AFAA-94188B17C6C2}" type="datetimeFigureOut">
               <a:rPr lang="zh-TW" altLang="en-US" smtClean="0"/>
-              <a:t>2018/3/18</a:t>
+              <a:t>2019/7/20</a:t>
             </a:fld>
             <a:endParaRPr lang="zh-TW" altLang="en-US"/>
           </a:p>
@@ -1849,7 +1849,7 @@
           <a:p>
             <a:fld id="{304EAD91-56F9-4EB2-AFAA-94188B17C6C2}" type="datetimeFigureOut">
               <a:rPr lang="zh-TW" altLang="en-US" smtClean="0"/>
-              <a:t>2018/3/18</a:t>
+              <a:t>2019/7/20</a:t>
             </a:fld>
             <a:endParaRPr lang="zh-TW" altLang="en-US"/>
           </a:p>
@@ -1939,7 +1939,7 @@
           <a:p>
             <a:fld id="{304EAD91-56F9-4EB2-AFAA-94188B17C6C2}" type="datetimeFigureOut">
               <a:rPr lang="zh-TW" altLang="en-US" smtClean="0"/>
-              <a:t>2018/3/18</a:t>
+              <a:t>2019/7/20</a:t>
             </a:fld>
             <a:endParaRPr lang="zh-TW" altLang="en-US"/>
           </a:p>
@@ -2024,8 +2024,8 @@
         </p:nvSpPr>
         <p:spPr>
           <a:xfrm>
-            <a:off x="457200" y="273050"/>
-            <a:ext cx="3008313" cy="1162050"/>
+            <a:off x="457201" y="204787"/>
+            <a:ext cx="3008313" cy="871538"/>
           </a:xfrm>
         </p:spPr>
         <p:txBody>
@@ -2056,8 +2056,8 @@
         </p:nvSpPr>
         <p:spPr>
           <a:xfrm>
-            <a:off x="3575050" y="273050"/>
-            <a:ext cx="5111750" cy="5853113"/>
+            <a:off x="3575050" y="204788"/>
+            <a:ext cx="5111750" cy="4389835"/>
           </a:xfrm>
         </p:spPr>
         <p:txBody>
@@ -2141,8 +2141,8 @@
         </p:nvSpPr>
         <p:spPr>
           <a:xfrm>
-            <a:off x="457200" y="1435100"/>
-            <a:ext cx="3008313" cy="4691063"/>
+            <a:off x="457201" y="1076326"/>
+            <a:ext cx="3008313" cy="3518297"/>
           </a:xfrm>
         </p:spPr>
         <p:txBody>
@@ -2211,7 +2211,7 @@
           <a:p>
             <a:fld id="{304EAD91-56F9-4EB2-AFAA-94188B17C6C2}" type="datetimeFigureOut">
               <a:rPr lang="zh-TW" altLang="en-US" smtClean="0"/>
-              <a:t>2018/3/18</a:t>
+              <a:t>2019/7/20</a:t>
             </a:fld>
             <a:endParaRPr lang="zh-TW" altLang="en-US"/>
           </a:p>
@@ -2296,8 +2296,8 @@
         </p:nvSpPr>
         <p:spPr>
           <a:xfrm>
-            <a:off x="1792288" y="4800600"/>
-            <a:ext cx="5486400" cy="566738"/>
+            <a:off x="1792288" y="3600450"/>
+            <a:ext cx="5486400" cy="425054"/>
           </a:xfrm>
         </p:spPr>
         <p:txBody>
@@ -2328,8 +2328,8 @@
         </p:nvSpPr>
         <p:spPr>
           <a:xfrm>
-            <a:off x="1792288" y="612775"/>
-            <a:ext cx="5486400" cy="4114800"/>
+            <a:off x="1792288" y="459581"/>
+            <a:ext cx="5486400" cy="3086100"/>
           </a:xfrm>
         </p:spPr>
         <p:txBody>
@@ -2393,8 +2393,8 @@
         </p:nvSpPr>
         <p:spPr>
           <a:xfrm>
-            <a:off x="1792288" y="5367338"/>
-            <a:ext cx="5486400" cy="804862"/>
+            <a:off x="1792288" y="4025503"/>
+            <a:ext cx="5486400" cy="603647"/>
           </a:xfrm>
         </p:spPr>
         <p:txBody>
@@ -2463,7 +2463,7 @@
           <a:p>
             <a:fld id="{304EAD91-56F9-4EB2-AFAA-94188B17C6C2}" type="datetimeFigureOut">
               <a:rPr lang="zh-TW" altLang="en-US" smtClean="0"/>
-              <a:t>2018/3/18</a:t>
+              <a:t>2019/7/20</a:t>
             </a:fld>
             <a:endParaRPr lang="zh-TW" altLang="en-US"/>
           </a:p>
@@ -2558,8 +2558,8 @@
         </p:nvSpPr>
         <p:spPr>
           <a:xfrm>
-            <a:off x="457200" y="274638"/>
-            <a:ext cx="8229600" cy="1143000"/>
+            <a:off x="457200" y="205979"/>
+            <a:ext cx="8229600" cy="857250"/>
           </a:xfrm>
           <a:prstGeom prst="rect">
             <a:avLst/>
@@ -2591,8 +2591,8 @@
         </p:nvSpPr>
         <p:spPr>
           <a:xfrm>
-            <a:off x="457200" y="1600200"/>
-            <a:ext cx="8229600" cy="4525963"/>
+            <a:off x="457200" y="1200151"/>
+            <a:ext cx="8229600" cy="3394472"/>
           </a:xfrm>
           <a:prstGeom prst="rect">
             <a:avLst/>
@@ -2653,8 +2653,8 @@
         </p:nvSpPr>
         <p:spPr>
           <a:xfrm>
-            <a:off x="457200" y="6356350"/>
-            <a:ext cx="2133600" cy="365125"/>
+            <a:off x="457200" y="4767263"/>
+            <a:ext cx="2133600" cy="273844"/>
           </a:xfrm>
           <a:prstGeom prst="rect">
             <a:avLst/>
@@ -2676,7 +2676,7 @@
           <a:p>
             <a:fld id="{304EAD91-56F9-4EB2-AFAA-94188B17C6C2}" type="datetimeFigureOut">
               <a:rPr lang="zh-TW" altLang="en-US" smtClean="0"/>
-              <a:t>2018/3/18</a:t>
+              <a:t>2019/7/20</a:t>
             </a:fld>
             <a:endParaRPr lang="zh-TW" altLang="en-US"/>
           </a:p>
@@ -2694,8 +2694,8 @@
         </p:nvSpPr>
         <p:spPr>
           <a:xfrm>
-            <a:off x="3124200" y="6356350"/>
-            <a:ext cx="2895600" cy="365125"/>
+            <a:off x="3124200" y="4767263"/>
+            <a:ext cx="2895600" cy="273844"/>
           </a:xfrm>
           <a:prstGeom prst="rect">
             <a:avLst/>
@@ -2731,8 +2731,8 @@
         </p:nvSpPr>
         <p:spPr>
           <a:xfrm>
-            <a:off x="6553200" y="6356350"/>
-            <a:ext cx="2133600" cy="365125"/>
+            <a:off x="6553200" y="4767263"/>
+            <a:ext cx="2133600" cy="273844"/>
           </a:xfrm>
           <a:prstGeom prst="rect">
             <a:avLst/>
@@ -3058,11 +3058,13 @@
         </p:nvSpPr>
         <p:spPr/>
         <p:txBody>
-          <a:bodyPr/>
-          <a:lstStyle/>
-          <a:p>
-            <a:r>
-              <a:rPr lang="zh-TW" altLang="en-US" b="1" dirty="0">
+          <a:bodyPr>
+            <a:normAutofit/>
+          </a:bodyPr>
+          <a:lstStyle/>
+          <a:p>
+            <a:r>
+              <a:rPr lang="zh-TW" altLang="en-US" sz="4000" b="1" dirty="0">
                 <a:solidFill>
                   <a:srgbClr val="660033"/>
                 </a:solidFill>
@@ -3095,7 +3097,7 @@
               <a:buNone/>
             </a:pPr>
             <a:r>
-              <a:rPr lang="zh-TW" altLang="en-US" sz="5400" b="1" dirty="0">
+              <a:rPr lang="zh-TW" altLang="en-US" sz="4800" b="1" dirty="0">
                 <a:solidFill>
                   <a:srgbClr val="660033"/>
                 </a:solidFill>
@@ -3105,7 +3107,7 @@
               <a:t>以真誠的</a:t>
             </a:r>
             <a:r>
-              <a:rPr lang="zh-TW" altLang="en-US" sz="5400" b="1" dirty="0" smtClean="0">
+              <a:rPr lang="zh-TW" altLang="en-US" sz="4800" b="1" dirty="0" smtClean="0">
                 <a:solidFill>
                   <a:srgbClr val="660033"/>
                 </a:solidFill>
@@ -3115,7 +3117,7 @@
               <a:t>心  降服</a:t>
             </a:r>
             <a:r>
-              <a:rPr lang="zh-TW" altLang="en-US" sz="5400" b="1" dirty="0">
+              <a:rPr lang="zh-TW" altLang="en-US" sz="4800" b="1" dirty="0">
                 <a:solidFill>
                   <a:srgbClr val="660033"/>
                 </a:solidFill>
@@ -3125,7 +3127,7 @@
               <a:t>在你</a:t>
             </a:r>
             <a:r>
-              <a:rPr lang="zh-TW" altLang="en-US" sz="5400" b="1" dirty="0" smtClean="0">
+              <a:rPr lang="zh-TW" altLang="en-US" sz="4800" b="1" dirty="0" smtClean="0">
                 <a:solidFill>
                   <a:srgbClr val="660033"/>
                 </a:solidFill>
@@ -3134,7 +3136,7 @@
               </a:rPr>
               <a:t>面前</a:t>
             </a:r>
-            <a:endParaRPr lang="en-US" altLang="zh-TW" sz="5400" b="1" dirty="0" smtClean="0">
+            <a:endParaRPr lang="en-US" altLang="zh-TW" sz="4800" b="1" dirty="0" smtClean="0">
               <a:solidFill>
                 <a:srgbClr val="660033"/>
               </a:solidFill>
@@ -3147,7 +3149,7 @@
               <a:buNone/>
             </a:pPr>
             <a:r>
-              <a:rPr lang="zh-TW" altLang="en-US" sz="5400" b="1" dirty="0" smtClean="0">
+              <a:rPr lang="zh-TW" altLang="en-US" sz="4800" b="1" dirty="0" smtClean="0">
                 <a:solidFill>
                   <a:srgbClr val="660033"/>
                 </a:solidFill>
@@ -3157,7 +3159,7 @@
               <a:t>開</a:t>
             </a:r>
             <a:r>
-              <a:rPr lang="zh-TW" altLang="en-US" sz="5400" b="1" dirty="0">
+              <a:rPr lang="zh-TW" altLang="en-US" sz="4800" b="1" dirty="0">
                 <a:solidFill>
                   <a:srgbClr val="660033"/>
                 </a:solidFill>
@@ -3167,7 +3169,7 @@
               <a:t>我心眼使我</a:t>
             </a:r>
             <a:r>
-              <a:rPr lang="zh-TW" altLang="en-US" sz="5400" b="1" dirty="0" smtClean="0">
+              <a:rPr lang="zh-TW" altLang="en-US" sz="4800" b="1" dirty="0" smtClean="0">
                 <a:solidFill>
                   <a:srgbClr val="660033"/>
                 </a:solidFill>
@@ -3176,7 +3178,7 @@
               </a:rPr>
               <a:t>看見</a:t>
             </a:r>
-            <a:endParaRPr lang="en-US" altLang="zh-TW" sz="5400" b="1" dirty="0">
+            <a:endParaRPr lang="en-US" altLang="zh-TW" sz="4800" b="1" dirty="0">
               <a:solidFill>
                 <a:srgbClr val="660033"/>
               </a:solidFill>
@@ -3189,7 +3191,7 @@
               <a:buNone/>
             </a:pPr>
             <a:r>
-              <a:rPr lang="zh-TW" altLang="en-US" sz="5400" b="1" dirty="0" smtClean="0">
+              <a:rPr lang="zh-TW" altLang="en-US" sz="4800" b="1" dirty="0" smtClean="0">
                 <a:solidFill>
                   <a:srgbClr val="660033"/>
                 </a:solidFill>
@@ -3199,7 +3201,7 @@
               <a:t>以</a:t>
             </a:r>
             <a:r>
-              <a:rPr lang="zh-TW" altLang="en-US" sz="5400" b="1" dirty="0">
+              <a:rPr lang="zh-TW" altLang="en-US" sz="4800" b="1" dirty="0">
                 <a:solidFill>
                   <a:srgbClr val="660033"/>
                 </a:solidFill>
@@ -3209,7 +3211,7 @@
               <a:t>感恩的</a:t>
             </a:r>
             <a:r>
-              <a:rPr lang="zh-TW" altLang="en-US" sz="5400" b="1" dirty="0" smtClean="0">
+              <a:rPr lang="zh-TW" altLang="en-US" sz="4800" b="1" dirty="0" smtClean="0">
                 <a:solidFill>
                   <a:srgbClr val="660033"/>
                 </a:solidFill>
@@ -3219,7 +3221,7 @@
               <a:t>心  領受</a:t>
             </a:r>
             <a:r>
-              <a:rPr lang="zh-TW" altLang="en-US" sz="5400" b="1" dirty="0">
+              <a:rPr lang="zh-TW" altLang="en-US" sz="4800" b="1" dirty="0">
                 <a:solidFill>
                   <a:srgbClr val="660033"/>
                 </a:solidFill>
@@ -3229,7 +3231,7 @@
               <a:t>生命</a:t>
             </a:r>
             <a:r>
-              <a:rPr lang="zh-TW" altLang="en-US" sz="5400" b="1" dirty="0" smtClean="0">
+              <a:rPr lang="zh-TW" altLang="en-US" sz="4800" b="1" dirty="0" smtClean="0">
                 <a:solidFill>
                   <a:srgbClr val="660033"/>
                 </a:solidFill>
@@ -3238,7 +3240,7 @@
               </a:rPr>
               <a:t>活水</a:t>
             </a:r>
-            <a:endParaRPr lang="en-US" altLang="zh-TW" sz="5400" b="1" dirty="0" smtClean="0">
+            <a:endParaRPr lang="en-US" altLang="zh-TW" sz="4800" b="1" dirty="0" smtClean="0">
               <a:solidFill>
                 <a:srgbClr val="660033"/>
               </a:solidFill>
@@ -3251,7 +3253,7 @@
               <a:buNone/>
             </a:pPr>
             <a:r>
-              <a:rPr lang="zh-TW" altLang="en-US" sz="5400" b="1" dirty="0" smtClean="0">
+              <a:rPr lang="zh-TW" altLang="en-US" sz="4800" b="1" dirty="0" smtClean="0">
                 <a:solidFill>
                   <a:srgbClr val="660033"/>
                 </a:solidFill>
@@ -3261,7 +3263,7 @@
               <a:t>從</a:t>
             </a:r>
             <a:r>
-              <a:rPr lang="zh-TW" altLang="en-US" sz="5400" b="1" dirty="0">
+              <a:rPr lang="zh-TW" altLang="en-US" sz="4800" b="1" dirty="0">
                 <a:solidFill>
                   <a:srgbClr val="660033"/>
                 </a:solidFill>
@@ -3310,11 +3312,13 @@
         </p:nvSpPr>
         <p:spPr/>
         <p:txBody>
-          <a:bodyPr/>
-          <a:lstStyle/>
-          <a:p>
-            <a:r>
-              <a:rPr lang="zh-TW" altLang="en-US" b="1" dirty="0">
+          <a:bodyPr>
+            <a:normAutofit/>
+          </a:bodyPr>
+          <a:lstStyle/>
+          <a:p>
+            <a:r>
+              <a:rPr lang="zh-TW" altLang="en-US" sz="4000" b="1" dirty="0">
                 <a:solidFill>
                   <a:srgbClr val="660033"/>
                 </a:solidFill>
@@ -3338,8 +3342,8 @@
         </p:nvSpPr>
         <p:spPr>
           <a:xfrm>
-            <a:off x="0" y="1600200"/>
-            <a:ext cx="9144000" cy="4525963"/>
+            <a:off x="0" y="1200151"/>
+            <a:ext cx="9144000" cy="3394472"/>
           </a:xfrm>
         </p:spPr>
         <p:txBody>
@@ -3352,7 +3356,7 @@
               <a:buNone/>
             </a:pPr>
             <a:r>
-              <a:rPr lang="zh-TW" altLang="en-US" sz="5400" b="1" dirty="0">
+              <a:rPr lang="zh-TW" altLang="en-US" sz="4800" b="1" dirty="0">
                 <a:solidFill>
                   <a:srgbClr val="660033"/>
                 </a:solidFill>
@@ -3362,7 +3366,7 @@
               <a:t>何等</a:t>
             </a:r>
             <a:r>
-              <a:rPr lang="zh-TW" altLang="en-US" sz="5400" b="1" dirty="0" smtClean="0">
+              <a:rPr lang="zh-TW" altLang="en-US" sz="4800" b="1" dirty="0">
                 <a:solidFill>
                   <a:srgbClr val="660033"/>
                 </a:solidFill>
@@ -3372,7 +3376,7 @@
               <a:t>恩典  你</a:t>
             </a:r>
             <a:r>
-              <a:rPr lang="zh-TW" altLang="en-US" sz="5400" b="1" dirty="0">
+              <a:rPr lang="zh-TW" altLang="en-US" sz="4800" b="1" dirty="0">
                 <a:solidFill>
                   <a:srgbClr val="660033"/>
                 </a:solidFill>
@@ -3382,7 +3386,7 @@
               <a:t>竟然</a:t>
             </a:r>
             <a:r>
-              <a:rPr lang="zh-TW" altLang="en-US" sz="5400" b="1" dirty="0" smtClean="0">
+              <a:rPr lang="zh-TW" altLang="en-US" sz="4800" b="1" dirty="0">
                 <a:solidFill>
                   <a:srgbClr val="660033"/>
                 </a:solidFill>
@@ -3391,7 +3395,7 @@
               </a:rPr>
               <a:t>在乎我</a:t>
             </a:r>
-            <a:endParaRPr lang="en-US" altLang="zh-TW" sz="5400" b="1" dirty="0" smtClean="0">
+            <a:endParaRPr lang="en-US" altLang="zh-TW" sz="4800" b="1" dirty="0">
               <a:solidFill>
                 <a:srgbClr val="660033"/>
               </a:solidFill>
@@ -3404,7 +3408,7 @@
               <a:buNone/>
             </a:pPr>
             <a:r>
-              <a:rPr lang="zh-TW" altLang="en-US" sz="5400" b="1" dirty="0" smtClean="0">
+              <a:rPr lang="zh-TW" altLang="en-US" sz="4800" b="1" dirty="0">
                 <a:solidFill>
                   <a:srgbClr val="660033"/>
                 </a:solidFill>
@@ -3414,7 +3418,7 @@
               <a:t>何等恩典  你</a:t>
             </a:r>
             <a:r>
-              <a:rPr lang="zh-TW" altLang="en-US" sz="5400" b="1" dirty="0">
+              <a:rPr lang="zh-TW" altLang="en-US" sz="4800" b="1" dirty="0">
                 <a:solidFill>
                   <a:srgbClr val="660033"/>
                 </a:solidFill>
@@ -3424,7 +3428,7 @@
               <a:t>寶血為我</a:t>
             </a:r>
             <a:r>
-              <a:rPr lang="zh-TW" altLang="en-US" sz="5400" b="1" dirty="0" smtClean="0">
+              <a:rPr lang="zh-TW" altLang="en-US" sz="4800" b="1" dirty="0">
                 <a:solidFill>
                   <a:srgbClr val="660033"/>
                 </a:solidFill>
@@ -3433,7 +3437,7 @@
               </a:rPr>
               <a:t>流</a:t>
             </a:r>
-            <a:endParaRPr lang="en-US" altLang="zh-TW" sz="5400" b="1" dirty="0">
+            <a:endParaRPr lang="en-US" altLang="zh-TW" sz="4800" b="1" dirty="0">
               <a:solidFill>
                 <a:srgbClr val="660033"/>
               </a:solidFill>
@@ -3446,7 +3450,7 @@
               <a:buNone/>
             </a:pPr>
             <a:r>
-              <a:rPr lang="zh-TW" altLang="en-US" sz="5400" b="1" dirty="0" smtClean="0">
+              <a:rPr lang="zh-TW" altLang="en-US" sz="4800" b="1" dirty="0">
                 <a:solidFill>
                   <a:srgbClr val="660033"/>
                 </a:solidFill>
@@ -3456,7 +3460,7 @@
               <a:t>何等恩典  你</a:t>
             </a:r>
             <a:r>
-              <a:rPr lang="zh-TW" altLang="en-US" sz="5400" b="1" dirty="0">
+              <a:rPr lang="zh-TW" altLang="en-US" sz="4800" b="1" dirty="0">
                 <a:solidFill>
                   <a:srgbClr val="660033"/>
                 </a:solidFill>
@@ -3466,7 +3470,7 @@
               <a:t>以尊貴</a:t>
             </a:r>
             <a:r>
-              <a:rPr lang="zh-TW" altLang="en-US" sz="5400" b="1" dirty="0" smtClean="0">
+              <a:rPr lang="zh-TW" altLang="en-US" sz="4800" b="1" dirty="0">
                 <a:solidFill>
                   <a:srgbClr val="660033"/>
                 </a:solidFill>
@@ -3475,7 +3479,7 @@
               </a:rPr>
               <a:t>榮耀</a:t>
             </a:r>
-            <a:endParaRPr lang="en-US" altLang="zh-TW" sz="5400" b="1" dirty="0" smtClean="0">
+            <a:endParaRPr lang="en-US" altLang="zh-TW" sz="4800" b="1" dirty="0">
               <a:solidFill>
                 <a:srgbClr val="660033"/>
               </a:solidFill>
@@ -3488,7 +3492,7 @@
               <a:buNone/>
             </a:pPr>
             <a:r>
-              <a:rPr lang="zh-TW" altLang="en-US" sz="5400" b="1" dirty="0" smtClean="0">
+              <a:rPr lang="zh-TW" altLang="en-US" sz="4800" b="1" dirty="0">
                 <a:solidFill>
                   <a:srgbClr val="660033"/>
                 </a:solidFill>
@@ -3498,7 +3502,7 @@
               <a:t>為</a:t>
             </a:r>
             <a:r>
-              <a:rPr lang="zh-TW" altLang="en-US" sz="5400" b="1" dirty="0">
+              <a:rPr lang="zh-TW" altLang="en-US" sz="4800" b="1" dirty="0">
                 <a:solidFill>
                   <a:srgbClr val="660033"/>
                 </a:solidFill>
@@ -3508,7 +3512,7 @@
               <a:t>我</a:t>
             </a:r>
             <a:r>
-              <a:rPr lang="zh-TW" altLang="en-US" sz="5400" b="1" dirty="0" smtClean="0">
+              <a:rPr lang="zh-TW" altLang="en-US" sz="4800" b="1" dirty="0">
                 <a:solidFill>
                   <a:srgbClr val="660033"/>
                 </a:solidFill>
@@ -3518,7 +3522,7 @@
               <a:t>冠冕  我</a:t>
             </a:r>
             <a:r>
-              <a:rPr lang="zh-TW" altLang="en-US" sz="5400" b="1" dirty="0">
+              <a:rPr lang="zh-TW" altLang="en-US" sz="4800" b="1" dirty="0">
                 <a:solidFill>
                   <a:srgbClr val="660033"/>
                 </a:solidFill>
@@ -3567,11 +3571,13 @@
         </p:nvSpPr>
         <p:spPr/>
         <p:txBody>
-          <a:bodyPr/>
-          <a:lstStyle/>
-          <a:p>
-            <a:r>
-              <a:rPr lang="zh-TW" altLang="en-US" b="1" dirty="0">
+          <a:bodyPr>
+            <a:normAutofit/>
+          </a:bodyPr>
+          <a:lstStyle/>
+          <a:p>
+            <a:r>
+              <a:rPr lang="zh-TW" altLang="en-US" sz="4000" b="1" dirty="0">
                 <a:solidFill>
                   <a:srgbClr val="660033"/>
                 </a:solidFill>
@@ -3595,8 +3601,8 @@
         </p:nvSpPr>
         <p:spPr>
           <a:xfrm>
-            <a:off x="0" y="1600200"/>
-            <a:ext cx="9144000" cy="4525963"/>
+            <a:off x="0" y="1200151"/>
+            <a:ext cx="9144000" cy="3394472"/>
           </a:xfrm>
         </p:spPr>
         <p:txBody>
@@ -3609,7 +3615,7 @@
               <a:buNone/>
             </a:pPr>
             <a:r>
-              <a:rPr lang="zh-TW" altLang="en-US" sz="5400" b="1" dirty="0">
+              <a:rPr lang="zh-TW" altLang="en-US" sz="4800" b="1" dirty="0">
                 <a:solidFill>
                   <a:srgbClr val="660033"/>
                 </a:solidFill>
@@ -3619,7 +3625,7 @@
               <a:t>你已挪去我所有</a:t>
             </a:r>
             <a:r>
-              <a:rPr lang="zh-TW" altLang="en-US" sz="5400" b="1" dirty="0" smtClean="0">
+              <a:rPr lang="zh-TW" altLang="en-US" sz="4800" b="1" dirty="0">
                 <a:solidFill>
                   <a:srgbClr val="660033"/>
                 </a:solidFill>
@@ -3628,7 +3634,7 @@
               </a:rPr>
               <a:t>枷鎖</a:t>
             </a:r>
-            <a:endParaRPr lang="en-US" altLang="zh-TW" sz="5400" b="1" dirty="0" smtClean="0">
+            <a:endParaRPr lang="en-US" altLang="zh-TW" sz="4800" b="1" dirty="0">
               <a:solidFill>
                 <a:srgbClr val="660033"/>
               </a:solidFill>
@@ -3641,7 +3647,7 @@
               <a:buNone/>
             </a:pPr>
             <a:r>
-              <a:rPr lang="zh-TW" altLang="en-US" sz="5400" b="1" dirty="0" smtClean="0">
+              <a:rPr lang="zh-TW" altLang="en-US" sz="4800" b="1" dirty="0">
                 <a:solidFill>
                   <a:srgbClr val="660033"/>
                 </a:solidFill>
@@ -3651,7 +3657,7 @@
               <a:t>你</a:t>
             </a:r>
             <a:r>
-              <a:rPr lang="zh-TW" altLang="en-US" sz="5400" b="1" dirty="0">
+              <a:rPr lang="zh-TW" altLang="en-US" sz="4800" b="1" dirty="0">
                 <a:solidFill>
                   <a:srgbClr val="660033"/>
                 </a:solidFill>
@@ -3661,7 +3667,7 @@
               <a:t>已挪去我所有</a:t>
             </a:r>
             <a:r>
-              <a:rPr lang="zh-TW" altLang="en-US" sz="5400" b="1" dirty="0" smtClean="0">
+              <a:rPr lang="zh-TW" altLang="en-US" sz="4800" b="1" dirty="0">
                 <a:solidFill>
                   <a:srgbClr val="660033"/>
                 </a:solidFill>
@@ -3670,7 +3676,7 @@
               </a:rPr>
               <a:t>重擔</a:t>
             </a:r>
-            <a:endParaRPr lang="en-US" altLang="zh-TW" sz="5400" b="1" dirty="0">
+            <a:endParaRPr lang="en-US" altLang="zh-TW" sz="4800" b="1" dirty="0">
               <a:solidFill>
                 <a:srgbClr val="660033"/>
               </a:solidFill>
@@ -3683,7 +3689,7 @@
               <a:buNone/>
             </a:pPr>
             <a:r>
-              <a:rPr lang="zh-TW" altLang="en-US" sz="5400" b="1" dirty="0" smtClean="0">
+              <a:rPr lang="zh-TW" altLang="en-US" sz="4800" b="1" dirty="0">
                 <a:solidFill>
                   <a:srgbClr val="660033"/>
                 </a:solidFill>
@@ -3693,7 +3699,7 @@
               <a:t>你</a:t>
             </a:r>
             <a:r>
-              <a:rPr lang="zh-TW" altLang="en-US" sz="5400" b="1" dirty="0">
+              <a:rPr lang="zh-TW" altLang="en-US" sz="4800" b="1" dirty="0">
                 <a:solidFill>
                   <a:srgbClr val="660033"/>
                 </a:solidFill>
@@ -3703,7 +3709,7 @@
               <a:t>已挪去我所有</a:t>
             </a:r>
             <a:r>
-              <a:rPr lang="zh-TW" altLang="en-US" sz="5400" b="1" dirty="0" smtClean="0">
+              <a:rPr lang="zh-TW" altLang="en-US" sz="4800" b="1" dirty="0">
                 <a:solidFill>
                   <a:srgbClr val="660033"/>
                 </a:solidFill>
@@ -3712,7 +3718,7 @@
               </a:rPr>
               <a:t>傷悲</a:t>
             </a:r>
-            <a:endParaRPr lang="en-US" altLang="zh-TW" sz="5400" b="1" dirty="0" smtClean="0">
+            <a:endParaRPr lang="en-US" altLang="zh-TW" sz="4800" b="1" dirty="0">
               <a:solidFill>
                 <a:srgbClr val="660033"/>
               </a:solidFill>
@@ -3725,7 +3731,7 @@
               <a:buNone/>
             </a:pPr>
             <a:r>
-              <a:rPr lang="zh-TW" altLang="en-US" sz="5400" b="1" dirty="0" smtClean="0">
+              <a:rPr lang="zh-TW" altLang="en-US" sz="4800" b="1" dirty="0">
                 <a:solidFill>
                   <a:srgbClr val="660033"/>
                 </a:solidFill>
@@ -3735,7 +3741,7 @@
               <a:t>你</a:t>
             </a:r>
             <a:r>
-              <a:rPr lang="zh-TW" altLang="en-US" sz="5400" b="1" dirty="0">
+              <a:rPr lang="zh-TW" altLang="en-US" sz="4800" b="1" dirty="0">
                 <a:solidFill>
                   <a:srgbClr val="660033"/>
                 </a:solidFill>

</xml_diff>